<commit_message>
Edited presentation. SUPER FINAL
Elijaaaah, please download. :) thanks!
</commit_message>
<xml_diff>
--- a/2ndsprint.pptx
+++ b/2ndsprint.pptx
@@ -6,7 +6,7 @@
     <p:sldMasterId id="2147483650" r:id="rId2"/>
   </p:sldMasterIdLst>
   <p:notesMasterIdLst>
-    <p:notesMasterId r:id="rId11"/>
+    <p:notesMasterId r:id="rId12"/>
   </p:notesMasterIdLst>
   <p:sldIdLst>
     <p:sldId id="256" r:id="rId3"/>
@@ -14,9 +14,10 @@
     <p:sldId id="258" r:id="rId5"/>
     <p:sldId id="259" r:id="rId6"/>
     <p:sldId id="260" r:id="rId7"/>
-    <p:sldId id="262" r:id="rId8"/>
-    <p:sldId id="261" r:id="rId9"/>
-    <p:sldId id="263" r:id="rId10"/>
+    <p:sldId id="264" r:id="rId8"/>
+    <p:sldId id="262" r:id="rId9"/>
+    <p:sldId id="261" r:id="rId10"/>
+    <p:sldId id="263" r:id="rId11"/>
   </p:sldIdLst>
   <p:sldSz cx="9144000" cy="6858000" type="screen4x3"/>
   <p:notesSz cx="6858000" cy="9144000"/>
@@ -159,6 +160,7 @@
           <p14:sldIdLst>
             <p14:sldId id="259"/>
             <p14:sldId id="260"/>
+            <p14:sldId id="264"/>
             <p14:sldId id="262"/>
             <p14:sldId id="261"/>
             <p14:sldId id="263"/>
@@ -248,11 +250,11 @@
           <c:showBubbleSize val="0"/>
         </c:dLbls>
         <c:gapWidth val="150"/>
-        <c:axId val="155480448"/>
-        <c:axId val="155481984"/>
+        <c:axId val="168883328"/>
+        <c:axId val="168884864"/>
       </c:barChart>
       <c:catAx>
-        <c:axId val="155480448"/>
+        <c:axId val="168883328"/>
         <c:scaling>
           <c:orientation val="minMax"/>
         </c:scaling>
@@ -261,7 +263,7 @@
         <c:majorTickMark val="out"/>
         <c:minorTickMark val="none"/>
         <c:tickLblPos val="nextTo"/>
-        <c:crossAx val="155481984"/>
+        <c:crossAx val="168884864"/>
         <c:crosses val="autoZero"/>
         <c:auto val="1"/>
         <c:lblAlgn val="ctr"/>
@@ -269,7 +271,7 @@
         <c:noMultiLvlLbl val="0"/>
       </c:catAx>
       <c:valAx>
-        <c:axId val="155481984"/>
+        <c:axId val="168884864"/>
         <c:scaling>
           <c:orientation val="minMax"/>
         </c:scaling>
@@ -280,7 +282,7 @@
         <c:majorTickMark val="out"/>
         <c:minorTickMark val="none"/>
         <c:tickLblPos val="nextTo"/>
-        <c:crossAx val="155480448"/>
+        <c:crossAx val="168883328"/>
         <c:crosses val="autoZero"/>
         <c:crossBetween val="between"/>
       </c:valAx>
@@ -507,11 +509,11 @@
           <c:showBubbleSize val="0"/>
         </c:dLbls>
         <c:gapWidth val="150"/>
-        <c:axId val="167546240"/>
-        <c:axId val="167560320"/>
+        <c:axId val="168838272"/>
+        <c:axId val="168839808"/>
       </c:barChart>
       <c:catAx>
-        <c:axId val="167546240"/>
+        <c:axId val="168838272"/>
         <c:scaling>
           <c:orientation val="minMax"/>
         </c:scaling>
@@ -520,7 +522,7 @@
         <c:majorTickMark val="out"/>
         <c:minorTickMark val="none"/>
         <c:tickLblPos val="nextTo"/>
-        <c:crossAx val="167560320"/>
+        <c:crossAx val="168839808"/>
         <c:crosses val="autoZero"/>
         <c:auto val="1"/>
         <c:lblAlgn val="ctr"/>
@@ -528,7 +530,7 @@
         <c:noMultiLvlLbl val="0"/>
       </c:catAx>
       <c:valAx>
-        <c:axId val="167560320"/>
+        <c:axId val="168839808"/>
         <c:scaling>
           <c:orientation val="minMax"/>
         </c:scaling>
@@ -539,7 +541,7 @@
         <c:majorTickMark val="out"/>
         <c:minorTickMark val="none"/>
         <c:tickLblPos val="nextTo"/>
-        <c:crossAx val="167546240"/>
+        <c:crossAx val="168838272"/>
         <c:crosses val="autoZero"/>
         <c:crossBetween val="between"/>
       </c:valAx>
@@ -9746,6 +9748,314 @@
           <a:chExt cx="0" cy="0"/>
         </a:xfrm>
       </p:grpSpPr>
+      <p:pic>
+        <p:nvPicPr>
+          <p:cNvPr id="1027" name="Picture 3"/>
+          <p:cNvPicPr>
+            <a:picLocks noChangeAspect="1" noChangeArrowheads="1"/>
+          </p:cNvPicPr>
+          <p:nvPr/>
+        </p:nvPicPr>
+        <p:blipFill>
+          <a:blip r:embed="rId2" cstate="print">
+            <a:extLst>
+              <a:ext uri="{28A0092B-C50C-407E-A947-70E740481C1C}">
+                <a14:useLocalDpi xmlns:a14="http://schemas.microsoft.com/office/drawing/2010/main" val="0"/>
+              </a:ext>
+            </a:extLst>
+          </a:blip>
+          <a:srcRect/>
+          <a:stretch>
+            <a:fillRect/>
+          </a:stretch>
+        </p:blipFill>
+        <p:spPr bwMode="auto">
+          <a:xfrm>
+            <a:off x="6718444" y="-41557"/>
+            <a:ext cx="2411692" cy="2411692"/>
+          </a:xfrm>
+          <a:prstGeom prst="rect">
+            <a:avLst/>
+          </a:prstGeom>
+          <a:noFill/>
+          <a:ln>
+            <a:noFill/>
+          </a:ln>
+          <a:effectLst/>
+          <a:extLst>
+            <a:ext uri="{909E8E84-426E-40DD-AFC4-6F175D3DCCD1}">
+              <a14:hiddenFill xmlns:a14="http://schemas.microsoft.com/office/drawing/2010/main">
+                <a:solidFill>
+                  <a:schemeClr val="accent1"/>
+                </a:solidFill>
+              </a14:hiddenFill>
+            </a:ext>
+            <a:ext uri="{91240B29-F687-4F45-9708-019B960494DF}">
+              <a14:hiddenLine xmlns:a14="http://schemas.microsoft.com/office/drawing/2010/main" w="9525">
+                <a:solidFill>
+                  <a:schemeClr val="tx1"/>
+                </a:solidFill>
+                <a:miter lim="800000"/>
+                <a:headEnd/>
+                <a:tailEnd/>
+              </a14:hiddenLine>
+            </a:ext>
+            <a:ext uri="{AF507438-7753-43E0-B8FC-AC1667EBCBE1}">
+              <a14:hiddenEffects xmlns:a14="http://schemas.microsoft.com/office/drawing/2010/main">
+                <a:effectLst>
+                  <a:outerShdw dist="35921" dir="2700000" algn="ctr" rotWithShape="0">
+                    <a:schemeClr val="bg2"/>
+                  </a:outerShdw>
+                </a:effectLst>
+              </a14:hiddenEffects>
+            </a:ext>
+          </a:extLst>
+        </p:spPr>
+      </p:pic>
+      <p:sp>
+        <p:nvSpPr>
+          <p:cNvPr id="4" name="Rectangle 3"/>
+          <p:cNvSpPr/>
+          <p:nvPr/>
+        </p:nvSpPr>
+        <p:spPr>
+          <a:xfrm>
+            <a:off x="221660" y="699654"/>
+            <a:ext cx="6832319" cy="769441"/>
+          </a:xfrm>
+          <a:prstGeom prst="rect">
+            <a:avLst/>
+          </a:prstGeom>
+          <a:noFill/>
+        </p:spPr>
+        <p:txBody>
+          <a:bodyPr wrap="none" lIns="91440" tIns="45720" rIns="91440" bIns="45720">
+            <a:spAutoFit/>
+          </a:bodyPr>
+          <a:lstStyle/>
+          <a:p>
+            <a:pPr algn="ctr"/>
+            <a:r>
+              <a:rPr lang="en-US" sz="4400" b="1" cap="all" spc="0" dirty="0" smtClean="0">
+                <a:ln w="9000" cmpd="sng">
+                  <a:solidFill>
+                    <a:schemeClr val="accent4">
+                      <a:shade val="50000"/>
+                      <a:satMod val="120000"/>
+                    </a:schemeClr>
+                  </a:solidFill>
+                  <a:prstDash val="solid"/>
+                </a:ln>
+                <a:gradFill>
+                  <a:gsLst>
+                    <a:gs pos="0">
+                      <a:schemeClr val="accent4">
+                        <a:shade val="20000"/>
+                        <a:satMod val="245000"/>
+                      </a:schemeClr>
+                    </a:gs>
+                    <a:gs pos="43000">
+                      <a:schemeClr val="accent4">
+                        <a:satMod val="255000"/>
+                      </a:schemeClr>
+                    </a:gs>
+                    <a:gs pos="48000">
+                      <a:schemeClr val="accent4">
+                        <a:shade val="85000"/>
+                        <a:satMod val="255000"/>
+                      </a:schemeClr>
+                    </a:gs>
+                    <a:gs pos="100000">
+                      <a:schemeClr val="accent4">
+                        <a:shade val="20000"/>
+                        <a:satMod val="245000"/>
+                      </a:schemeClr>
+                    </a:gs>
+                  </a:gsLst>
+                  <a:lin ang="5400000"/>
+                </a:gradFill>
+                <a:effectLst>
+                  <a:reflection blurRad="12700" stA="28000" endPos="45000" dist="1000" dir="5400000" sy="-100000" algn="bl" rotWithShape="0"/>
+                </a:effectLst>
+              </a:rPr>
+              <a:t>Sprint’s Techniques!</a:t>
+            </a:r>
+            <a:endParaRPr lang="en-US" sz="4400" b="1" cap="all" spc="0" dirty="0">
+              <a:ln w="9000" cmpd="sng">
+                <a:solidFill>
+                  <a:schemeClr val="accent4">
+                    <a:shade val="50000"/>
+                    <a:satMod val="120000"/>
+                  </a:schemeClr>
+                </a:solidFill>
+                <a:prstDash val="solid"/>
+              </a:ln>
+              <a:gradFill>
+                <a:gsLst>
+                  <a:gs pos="0">
+                    <a:schemeClr val="accent4">
+                      <a:shade val="20000"/>
+                      <a:satMod val="245000"/>
+                    </a:schemeClr>
+                  </a:gs>
+                  <a:gs pos="43000">
+                    <a:schemeClr val="accent4">
+                      <a:satMod val="255000"/>
+                    </a:schemeClr>
+                  </a:gs>
+                  <a:gs pos="48000">
+                    <a:schemeClr val="accent4">
+                      <a:shade val="85000"/>
+                      <a:satMod val="255000"/>
+                    </a:schemeClr>
+                  </a:gs>
+                  <a:gs pos="100000">
+                    <a:schemeClr val="accent4">
+                      <a:shade val="20000"/>
+                      <a:satMod val="245000"/>
+                    </a:schemeClr>
+                  </a:gs>
+                </a:gsLst>
+                <a:lin ang="5400000"/>
+              </a:gradFill>
+              <a:effectLst>
+                <a:reflection blurRad="12700" stA="28000" endPos="45000" dist="1000" dir="5400000" sy="-100000" algn="bl" rotWithShape="0"/>
+              </a:effectLst>
+            </a:endParaRPr>
+          </a:p>
+        </p:txBody>
+      </p:sp>
+      <p:pic>
+        <p:nvPicPr>
+          <p:cNvPr id="1026" name="Picture 2"/>
+          <p:cNvPicPr>
+            <a:picLocks noChangeAspect="1" noChangeArrowheads="1"/>
+          </p:cNvPicPr>
+          <p:nvPr/>
+        </p:nvPicPr>
+        <p:blipFill>
+          <a:blip r:embed="rId3">
+            <a:extLst>
+              <a:ext uri="{28A0092B-C50C-407E-A947-70E740481C1C}">
+                <a14:useLocalDpi xmlns:a14="http://schemas.microsoft.com/office/drawing/2010/main" val="0"/>
+              </a:ext>
+            </a:extLst>
+          </a:blip>
+          <a:srcRect/>
+          <a:stretch>
+            <a:fillRect/>
+          </a:stretch>
+        </p:blipFill>
+        <p:spPr bwMode="auto">
+          <a:xfrm>
+            <a:off x="282456" y="1801090"/>
+            <a:ext cx="8861544" cy="4823385"/>
+          </a:xfrm>
+          <a:prstGeom prst="rect">
+            <a:avLst/>
+          </a:prstGeom>
+          <a:noFill/>
+          <a:ln>
+            <a:noFill/>
+          </a:ln>
+          <a:effectLst/>
+          <a:extLst>
+            <a:ext uri="{909E8E84-426E-40DD-AFC4-6F175D3DCCD1}">
+              <a14:hiddenFill xmlns:a14="http://schemas.microsoft.com/office/drawing/2010/main">
+                <a:solidFill>
+                  <a:schemeClr val="accent1"/>
+                </a:solidFill>
+              </a14:hiddenFill>
+            </a:ext>
+            <a:ext uri="{91240B29-F687-4F45-9708-019B960494DF}">
+              <a14:hiddenLine xmlns:a14="http://schemas.microsoft.com/office/drawing/2010/main" w="9525">
+                <a:solidFill>
+                  <a:schemeClr val="tx1"/>
+                </a:solidFill>
+                <a:miter lim="800000"/>
+                <a:headEnd/>
+                <a:tailEnd/>
+              </a14:hiddenLine>
+            </a:ext>
+            <a:ext uri="{AF507438-7753-43E0-B8FC-AC1667EBCBE1}">
+              <a14:hiddenEffects xmlns:a14="http://schemas.microsoft.com/office/drawing/2010/main">
+                <a:effectLst>
+                  <a:outerShdw dist="35921" dir="2700000" algn="ctr" rotWithShape="0">
+                    <a:schemeClr val="bg2"/>
+                  </a:outerShdw>
+                </a:effectLst>
+              </a14:hiddenEffects>
+            </a:ext>
+          </a:extLst>
+        </p:spPr>
+      </p:pic>
+      <p:sp>
+        <p:nvSpPr>
+          <p:cNvPr id="5" name="TextBox 4"/>
+          <p:cNvSpPr txBox="1"/>
+          <p:nvPr/>
+        </p:nvSpPr>
+        <p:spPr>
+          <a:xfrm>
+            <a:off x="221660" y="5666509"/>
+            <a:ext cx="7065819" cy="646331"/>
+          </a:xfrm>
+          <a:prstGeom prst="rect">
+            <a:avLst/>
+          </a:prstGeom>
+          <a:noFill/>
+        </p:spPr>
+        <p:txBody>
+          <a:bodyPr wrap="square" rtlCol="0">
+            <a:spAutoFit/>
+          </a:bodyPr>
+          <a:lstStyle/>
+          <a:p>
+            <a:r>
+              <a:rPr lang="en-PH" sz="3600" b="1" dirty="0" smtClean="0"/>
+              <a:t>Utilization of GITHUB.</a:t>
+            </a:r>
+            <a:endParaRPr lang="en-PH" sz="3600" b="1" dirty="0"/>
+          </a:p>
+        </p:txBody>
+      </p:sp>
+    </p:spTree>
+    <p:extLst>
+      <p:ext uri="{BB962C8B-B14F-4D97-AF65-F5344CB8AC3E}">
+        <p14:creationId xmlns:p14="http://schemas.microsoft.com/office/powerpoint/2010/main" val="1674083848"/>
+      </p:ext>
+    </p:extLst>
+  </p:cSld>
+  <p:clrMapOvr>
+    <a:masterClrMapping/>
+  </p:clrMapOvr>
+  <p:timing>
+    <p:tnLst>
+      <p:par>
+        <p:cTn id="1" dur="indefinite" restart="never" nodeType="tmRoot"/>
+      </p:par>
+    </p:tnLst>
+  </p:timing>
+</p:sld>
+</file>
+
+<file path=ppt/slides/slide7.xml><?xml version="1.0" encoding="utf-8"?>
+<p:sld xmlns:a="http://schemas.openxmlformats.org/drawingml/2006/main" xmlns:r="http://schemas.openxmlformats.org/officeDocument/2006/relationships" xmlns:p="http://schemas.openxmlformats.org/presentationml/2006/main">
+  <p:cSld>
+    <p:spTree>
+      <p:nvGrpSpPr>
+        <p:cNvPr id="1" name=""/>
+        <p:cNvGrpSpPr/>
+        <p:nvPr/>
+      </p:nvGrpSpPr>
+      <p:grpSpPr>
+        <a:xfrm>
+          <a:off x="0" y="0"/>
+          <a:ext cx="0" cy="0"/>
+          <a:chOff x="0" y="0"/>
+          <a:chExt cx="0" cy="0"/>
+        </a:xfrm>
+      </p:grpSpPr>
       <p:sp>
         <p:nvSpPr>
           <p:cNvPr id="2" name="Rectangle 1"/>
@@ -10137,7 +10447,7 @@
 </p:sld>
 </file>
 
-<file path=ppt/slides/slide7.xml><?xml version="1.0" encoding="utf-8"?>
+<file path=ppt/slides/slide8.xml><?xml version="1.0" encoding="utf-8"?>
 <p:sld xmlns:a="http://schemas.openxmlformats.org/drawingml/2006/main" xmlns:r="http://schemas.openxmlformats.org/officeDocument/2006/relationships" xmlns:p="http://schemas.openxmlformats.org/presentationml/2006/main">
   <p:cSld>
     <p:spTree>
@@ -10428,7 +10738,7 @@
 </p:sld>
 </file>
 
-<file path=ppt/slides/slide8.xml><?xml version="1.0" encoding="utf-8"?>
+<file path=ppt/slides/slide9.xml><?xml version="1.0" encoding="utf-8"?>
 <p:sld xmlns:a="http://schemas.openxmlformats.org/drawingml/2006/main" xmlns:r="http://schemas.openxmlformats.org/officeDocument/2006/relationships" xmlns:p="http://schemas.openxmlformats.org/presentationml/2006/main">
   <p:cSld>
     <p:spTree>

</xml_diff>